<commit_message>
Deleted unnessary slide in presentation
</commit_message>
<xml_diff>
--- a/Documents/DB.pptx
+++ b/Documents/DB.pptx
@@ -12,9 +12,8 @@
     <p:sldId id="259" r:id="rId6"/>
     <p:sldId id="260" r:id="rId7"/>
     <p:sldId id="263" r:id="rId8"/>
-    <p:sldId id="264" r:id="rId9"/>
-    <p:sldId id="266" r:id="rId10"/>
-    <p:sldId id="262" r:id="rId11"/>
+    <p:sldId id="266" r:id="rId9"/>
+    <p:sldId id="262" r:id="rId10"/>
   </p:sldIdLst>
   <p:sldSz cx="9144000" cy="6858000" type="screen4x3"/>
   <p:notesSz cx="6858000" cy="9144000"/>
@@ -3897,84 +3896,6 @@
 </p:sld>
 </file>
 
-<file path=ppt/slides/slide10.xml><?xml version="1.0" encoding="utf-8"?>
-<p:sld xmlns:a="http://schemas.openxmlformats.org/drawingml/2006/main" xmlns:r="http://schemas.openxmlformats.org/officeDocument/2006/relationships" xmlns:p="http://schemas.openxmlformats.org/presentationml/2006/main">
-  <p:cSld>
-    <p:spTree>
-      <p:nvGrpSpPr>
-        <p:cNvPr id="1" name=""/>
-        <p:cNvGrpSpPr/>
-        <p:nvPr/>
-      </p:nvGrpSpPr>
-      <p:grpSpPr>
-        <a:xfrm>
-          <a:off x="0" y="0"/>
-          <a:ext cx="0" cy="0"/>
-          <a:chOff x="0" y="0"/>
-          <a:chExt cx="0" cy="0"/>
-        </a:xfrm>
-      </p:grpSpPr>
-      <p:sp>
-        <p:nvSpPr>
-          <p:cNvPr id="2" name="Заголовок 1"/>
-          <p:cNvSpPr>
-            <a:spLocks noGrp="1"/>
-          </p:cNvSpPr>
-          <p:nvPr>
-            <p:ph type="title"/>
-          </p:nvPr>
-        </p:nvSpPr>
-        <p:spPr/>
-        <p:txBody>
-          <a:bodyPr/>
-          <a:lstStyle/>
-          <a:p>
-            <a:r>
-              <a:rPr lang="en-US" dirty="0" smtClean="0"/>
-              <a:t>Hibernate</a:t>
-            </a:r>
-            <a:endParaRPr lang="uk-UA" dirty="0"/>
-          </a:p>
-        </p:txBody>
-      </p:sp>
-      <p:sp>
-        <p:nvSpPr>
-          <p:cNvPr id="3" name="Содержимое 2"/>
-          <p:cNvSpPr>
-            <a:spLocks noGrp="1"/>
-          </p:cNvSpPr>
-          <p:nvPr>
-            <p:ph sz="quarter" idx="1"/>
-          </p:nvPr>
-        </p:nvSpPr>
-        <p:spPr/>
-        <p:txBody>
-          <a:bodyPr/>
-          <a:lstStyle/>
-          <a:p>
-            <a:r>
-              <a:rPr lang="en-US" dirty="0" smtClean="0"/>
-              <a:t>???</a:t>
-            </a:r>
-            <a:endParaRPr lang="uk-UA" dirty="0"/>
-          </a:p>
-        </p:txBody>
-      </p:sp>
-    </p:spTree>
-  </p:cSld>
-  <p:clrMapOvr>
-    <a:masterClrMapping/>
-  </p:clrMapOvr>
-  <p:timing>
-    <p:tnLst>
-      <p:par>
-        <p:cTn id="1" dur="indefinite" restart="never" nodeType="tmRoot"/>
-      </p:par>
-    </p:tnLst>
-  </p:timing>
-</p:sld>
-</file>
-
 <file path=ppt/slides/slide2.xml><?xml version="1.0" encoding="utf-8"?>
 <p:sld xmlns:a="http://schemas.openxmlformats.org/drawingml/2006/main" xmlns:r="http://schemas.openxmlformats.org/officeDocument/2006/relationships" xmlns:p="http://schemas.openxmlformats.org/presentationml/2006/main">
   <p:cSld>
@@ -4032,11 +3953,7 @@
             </a:r>
             <a:r>
               <a:rPr lang="en-US" dirty="0" smtClean="0"/>
-              <a:t> </a:t>
-            </a:r>
-            <a:r>
-              <a:rPr lang="en-US" dirty="0" smtClean="0"/>
-              <a:t>(</a:t>
+              <a:t> (</a:t>
             </a:r>
             <a:r>
               <a:rPr lang="en-US" i="1" dirty="0" smtClean="0"/>
@@ -4044,26 +3961,14 @@
             </a:r>
             <a:r>
               <a:rPr lang="uk-UA" dirty="0" smtClean="0"/>
-              <a:t>)</a:t>
-            </a:r>
+              <a:t>) — технологія програмування, яка зв'язує бази даних з концепціями об'єктно-орієнтованих мов програмування, створюючи «віртуальну об'єктну базу даних».</a:t>
+            </a:r>
+            <a:endParaRPr lang="en-US" dirty="0" smtClean="0"/>
+          </a:p>
+          <a:p>
             <a:r>
               <a:rPr lang="uk-UA" dirty="0" smtClean="0"/>
-              <a:t> — технологія програмування, яка зв'язує бази даних з концепціями об'єктно-орієнтованих мов програмування, створюючи «віртуальну об'єктну базу даних</a:t>
-            </a:r>
-            <a:r>
-              <a:rPr lang="uk-UA" dirty="0" smtClean="0"/>
-              <a:t>».</a:t>
-            </a:r>
-            <a:endParaRPr lang="en-US" dirty="0" smtClean="0"/>
-          </a:p>
-          <a:p>
-            <a:r>
-              <a:rPr lang="uk-UA" dirty="0" smtClean="0"/>
-              <a:t>Суть проблеми полягає в перетворенні таких об'єктів у форму, в якій вони можуть бути збережені у файлах або базах даних, і які легко можуть бути витягнуті в подальшому, зі збереженням властивостей об'єктів і відносин між ними. Ці об'єкти називають «постійними» </a:t>
-            </a:r>
-            <a:r>
-              <a:rPr lang="uk-UA" dirty="0" smtClean="0"/>
-              <a:t>(англ. </a:t>
+              <a:t>Суть проблеми полягає в перетворенні таких об'єктів у форму, в якій вони можуть бути збережені у файлах або базах даних, і які легко можуть бути витягнуті в подальшому, зі збереженням властивостей об'єктів і відносин між ними. Ці об'єкти називають «постійними» (англ. </a:t>
             </a:r>
             <a:r>
               <a:rPr lang="en-US" i="1" dirty="0" smtClean="0"/>
@@ -4159,15 +4064,7 @@
           <a:p>
             <a:r>
               <a:rPr lang="uk-UA" dirty="0" smtClean="0"/>
-              <a:t>Програміст пише класи повністю вручну, </a:t>
-            </a:r>
-            <a:r>
-              <a:rPr lang="uk-UA" dirty="0" smtClean="0"/>
-              <a:t>і</a:t>
-            </a:r>
-            <a:r>
-              <a:rPr lang="uk-UA" dirty="0" smtClean="0"/>
-              <a:t> поля з примітивними типами даних, и </a:t>
+              <a:t>Програміст пише класи повністю вручну, і поля з примітивними типами даних, и </a:t>
             </a:r>
             <a:r>
               <a:rPr lang="uk-UA" dirty="0" err="1" smtClean="0">
@@ -4203,11 +4100,7 @@
             </a:r>
             <a:r>
               <a:rPr lang="uk-UA" dirty="0" smtClean="0"/>
-              <a:t> з </a:t>
-            </a:r>
-            <a:r>
-              <a:rPr lang="uk-UA" dirty="0" smtClean="0"/>
-              <a:t>таблицею TBL_CLIENTS, а поле </a:t>
+              <a:t> з таблицею TBL_CLIENTS, а поле </a:t>
             </a:r>
             <a:r>
               <a:rPr lang="uk-UA" dirty="0" err="1" smtClean="0"/>
@@ -4223,30 +4116,14 @@
             </a:r>
             <a:r>
               <a:rPr lang="uk-UA" dirty="0" smtClean="0"/>
-              <a:t> відповідає запису в таблиці TBL_CLIENTS, яка загружається по значенню </a:t>
-            </a:r>
-            <a:r>
-              <a:rPr lang="uk-UA" dirty="0" smtClean="0"/>
-              <a:t>і</a:t>
-            </a:r>
-            <a:r>
-              <a:rPr lang="uk-UA" dirty="0" smtClean="0"/>
-              <a:t>з стовпця CLIENT_ID таблиці TBL_ORDERS.</a:t>
+              <a:t> відповідає запису в таблиці TBL_CLIENTS, яка загружається по значенню із стовпця CLIENT_ID таблиці TBL_ORDERS.</a:t>
             </a:r>
             <a:br>
               <a:rPr lang="uk-UA" dirty="0" smtClean="0"/>
             </a:br>
             <a:r>
               <a:rPr lang="uk-UA" dirty="0" smtClean="0"/>
-              <a:t>Можуть бути </a:t>
-            </a:r>
-            <a:r>
-              <a:rPr lang="uk-UA" dirty="0" smtClean="0"/>
-              <a:t>і</a:t>
-            </a:r>
-            <a:r>
-              <a:rPr lang="uk-UA" dirty="0" smtClean="0"/>
-              <a:t> зворотні </a:t>
+              <a:t>Можуть бути і зворотні </a:t>
             </a:r>
             <a:r>
               <a:rPr lang="uk-UA" dirty="0" err="1" smtClean="0"/>
@@ -4286,15 +4163,7 @@
             </a:r>
             <a:r>
               <a:rPr lang="uk-UA" dirty="0" smtClean="0"/>
-              <a:t> по посиланням на цей запис в TBL_CLIENTS </a:t>
-            </a:r>
-            <a:r>
-              <a:rPr lang="uk-UA" dirty="0" smtClean="0"/>
-              <a:t>і</a:t>
-            </a:r>
-            <a:r>
-              <a:rPr lang="uk-UA" dirty="0" smtClean="0"/>
-              <a:t>з поля CLIENT_ID таблиці TBL_ORDERS. Тобто, в таблиці TBL_CLIENTS немає ніяких згадок про замовлення, але в класі </a:t>
+              <a:t> по посиланням на цей запис в TBL_CLIENTS із поля CLIENT_ID таблиці TBL_ORDERS. Тобто, в таблиці TBL_CLIENTS немає ніяких згадок про замовлення, але в класі </a:t>
             </a:r>
             <a:r>
               <a:rPr lang="uk-UA" dirty="0" err="1" smtClean="0"/>
@@ -4449,11 +4318,7 @@
           <a:p>
             <a:r>
               <a:rPr lang="ru-RU" dirty="0" smtClean="0"/>
-              <a:t>C </a:t>
-            </a:r>
-            <a:r>
-              <a:rPr lang="ru-RU" dirty="0" smtClean="0"/>
-              <a:t># код для доставки </a:t>
+              <a:t>C # код для доставки </a:t>
             </a:r>
             <a:r>
               <a:rPr lang="ru-RU" dirty="0" err="1" smtClean="0"/>
@@ -4461,11 +4326,7 @@
             </a:r>
             <a:r>
               <a:rPr lang="ru-RU" dirty="0" smtClean="0"/>
-              <a:t>, </a:t>
-            </a:r>
-            <a:r>
-              <a:rPr lang="ru-RU" dirty="0" smtClean="0"/>
-              <a:t>написан</a:t>
+              <a:t>, написан</a:t>
             </a:r>
             <a:r>
               <a:rPr lang="uk-UA" dirty="0" err="1" smtClean="0"/>
@@ -4473,11 +4334,7 @@
             </a:r>
             <a:r>
               <a:rPr lang="ru-RU" dirty="0" smtClean="0"/>
-              <a:t> </a:t>
-            </a:r>
-            <a:r>
-              <a:rPr lang="ru-RU" dirty="0" smtClean="0"/>
-              <a:t>на SQL, в ядро </a:t>
+              <a:t> на SQL, в ядро </a:t>
             </a:r>
             <a:r>
               <a:rPr lang="ru-RU" dirty="0" err="1" smtClean="0"/>
@@ -5617,11 +5474,7 @@
             <a:pPr lvl="1"/>
             <a:r>
               <a:rPr lang="en-US" dirty="0" smtClean="0"/>
-              <a:t>ADO.NET Entity </a:t>
-            </a:r>
-            <a:r>
-              <a:rPr lang="en-US" dirty="0" smtClean="0"/>
-              <a:t>Framework (</a:t>
+              <a:t>ADO.NET Entity Framework (</a:t>
             </a:r>
             <a:r>
               <a:rPr lang="uk-UA" dirty="0" smtClean="0"/>
@@ -5629,55 +5482,35 @@
             </a:r>
             <a:r>
               <a:rPr lang="en-US" dirty="0" smtClean="0"/>
-              <a:t>NET Framework 3.5 </a:t>
-            </a:r>
+              <a:t>NET Framework 3.5 SP1)</a:t>
+            </a:r>
+          </a:p>
+          <a:p>
+            <a:pPr lvl="1"/>
             <a:r>
               <a:rPr lang="en-US" dirty="0" smtClean="0"/>
-              <a:t>SP1)</a:t>
+              <a:t>LINQ to SQL (</a:t>
+            </a:r>
+            <a:r>
+              <a:rPr lang="uk-UA" dirty="0" smtClean="0"/>
+              <a:t>.</a:t>
+            </a:r>
+            <a:r>
+              <a:rPr lang="en-US" dirty="0" smtClean="0"/>
+              <a:t>NET Framework 3.5)</a:t>
             </a:r>
           </a:p>
           <a:p>
             <a:pPr lvl="1"/>
             <a:r>
-              <a:rPr lang="en-US" dirty="0" smtClean="0"/>
-              <a:t>LINQ to </a:t>
-            </a:r>
-            <a:r>
-              <a:rPr lang="en-US" dirty="0" smtClean="0"/>
-              <a:t>SQL</a:t>
-            </a:r>
-            <a:r>
-              <a:rPr lang="en-US" dirty="0" smtClean="0"/>
-              <a:t> </a:t>
+              <a:rPr lang="en-US" dirty="0" err="1" smtClean="0"/>
+              <a:t>Nhibernate</a:t>
             </a:r>
             <a:r>
               <a:rPr lang="en-US" dirty="0" smtClean="0"/>
               <a:t>(</a:t>
             </a:r>
             <a:r>
-              <a:rPr lang="uk-UA" dirty="0" smtClean="0"/>
-              <a:t>.</a:t>
-            </a:r>
-            <a:r>
-              <a:rPr lang="en-US" dirty="0" smtClean="0"/>
-              <a:t>NET Framework </a:t>
-            </a:r>
-            <a:r>
-              <a:rPr lang="en-US" dirty="0" smtClean="0"/>
-              <a:t>3.5)</a:t>
-            </a:r>
-          </a:p>
-          <a:p>
-            <a:pPr lvl="1"/>
-            <a:r>
-              <a:rPr lang="en-US" dirty="0" err="1" smtClean="0"/>
-              <a:t>Nhibernate</a:t>
-            </a:r>
-            <a:r>
-              <a:rPr lang="en-US" dirty="0" smtClean="0"/>
-              <a:t>(</a:t>
-            </a:r>
-            <a:r>
               <a:rPr lang="uk-UA" dirty="0" err="1" smtClean="0"/>
               <a:t>Портована</a:t>
             </a:r>
@@ -5707,11 +5540,7 @@
             <a:pPr lvl="1"/>
             <a:r>
               <a:rPr lang="en-US" dirty="0" smtClean="0"/>
-              <a:t>Java Persistence </a:t>
-            </a:r>
-            <a:r>
-              <a:rPr lang="en-US" dirty="0" smtClean="0"/>
-              <a:t>API</a:t>
+              <a:t>Java Persistence API</a:t>
             </a:r>
           </a:p>
           <a:p>
@@ -5829,52 +5658,36 @@
           <a:p>
             <a:r>
               <a:rPr lang="uk-UA" sz="2900" b="1" dirty="0" smtClean="0"/>
-              <a:t>Простота </a:t>
-            </a:r>
+              <a:t>Простота програмування</a:t>
+            </a:r>
+            <a:r>
+              <a:rPr lang="uk-UA" sz="2800" dirty="0" smtClean="0"/>
+              <a:t>(Компоненти даних </a:t>
+            </a:r>
+            <a:r>
+              <a:rPr lang="en-US" sz="2800" dirty="0" smtClean="0"/>
+              <a:t>ADO.NET </a:t>
+            </a:r>
+            <a:r>
+              <a:rPr lang="uk-UA" sz="2800" dirty="0" err="1" smtClean="0"/>
+              <a:t>інкапсулюють</a:t>
+            </a:r>
+            <a:r>
+              <a:rPr lang="uk-UA" sz="2800" dirty="0" smtClean="0"/>
+              <a:t> функціональні можливості доступу)</a:t>
+            </a:r>
+            <a:endParaRPr lang="uk-UA" dirty="0" smtClean="0"/>
+          </a:p>
+          <a:p>
             <a:r>
               <a:rPr lang="uk-UA" sz="2900" b="1" dirty="0" smtClean="0"/>
-              <a:t>програмування</a:t>
+              <a:t>Продуктивність </a:t>
             </a:r>
             <a:r>
               <a:rPr lang="uk-UA" sz="2800" dirty="0" smtClean="0"/>
               <a:t>(</a:t>
             </a:r>
             <a:r>
-              <a:rPr lang="uk-UA" sz="2800" dirty="0" smtClean="0"/>
-              <a:t>Компоненти даних </a:t>
-            </a:r>
-            <a:r>
-              <a:rPr lang="en-US" sz="2800" dirty="0" smtClean="0"/>
-              <a:t>ADO.NET </a:t>
-            </a:r>
-            <a:r>
-              <a:rPr lang="uk-UA" sz="2800" dirty="0" err="1" smtClean="0"/>
-              <a:t>інкапсулюють</a:t>
-            </a:r>
-            <a:r>
-              <a:rPr lang="uk-UA" sz="2800" dirty="0" smtClean="0"/>
-              <a:t> </a:t>
-            </a:r>
-            <a:r>
-              <a:rPr lang="uk-UA" sz="2800" dirty="0" smtClean="0"/>
-              <a:t>функціональні можливості доступу</a:t>
-            </a:r>
-            <a:r>
-              <a:rPr lang="uk-UA" sz="2800" dirty="0" smtClean="0"/>
-              <a:t>)</a:t>
-            </a:r>
-            <a:endParaRPr lang="uk-UA" dirty="0" smtClean="0"/>
-          </a:p>
-          <a:p>
-            <a:r>
-              <a:rPr lang="uk-UA" sz="2900" b="1" dirty="0" smtClean="0"/>
-              <a:t>Продуктивність </a:t>
-            </a:r>
-            <a:r>
-              <a:rPr lang="uk-UA" sz="2800" dirty="0" smtClean="0"/>
-              <a:t>(</a:t>
-            </a:r>
-            <a:r>
               <a:rPr lang="ru-RU" sz="2800" dirty="0" smtClean="0"/>
               <a:t>Для </a:t>
             </a:r>
@@ -5894,7 +5707,6 @@
               <a:rPr lang="ru-RU" sz="2800" dirty="0" smtClean="0"/>
               <a:t> </a:t>
             </a:r>
-            <a:endParaRPr lang="ru-RU" sz="2800" dirty="0" smtClean="0"/>
           </a:p>
           <a:p>
             <a:pPr>
@@ -6057,11 +5869,7 @@
             </a:r>
             <a:r>
               <a:rPr lang="uk-UA" smtClean="0"/>
-              <a:t>в </a:t>
-            </a:r>
-            <a:r>
-              <a:rPr lang="uk-UA" smtClean="0"/>
-              <a:t>составе </a:t>
+              <a:t>в составе </a:t>
             </a:r>
             <a:r>
               <a:rPr lang="uk-UA" dirty="0" smtClean="0"/>
@@ -6145,323 +5953,62 @@
         </p:nvSpPr>
         <p:spPr/>
         <p:txBody>
-          <a:bodyPr>
-            <a:normAutofit fontScale="90000"/>
-          </a:bodyPr>
-          <a:lstStyle/>
-          <a:p>
-            <a:r>
-              <a:rPr lang="ru-RU" dirty="0" err="1" smtClean="0"/>
-              <a:t>Постачальники</a:t>
-            </a:r>
-            <a:r>
-              <a:rPr lang="ru-RU" dirty="0" smtClean="0"/>
-              <a:t> </a:t>
-            </a:r>
-            <a:r>
-              <a:rPr lang="ru-RU" dirty="0" err="1" smtClean="0"/>
-              <a:t>даних</a:t>
-            </a:r>
-            <a:r>
-              <a:rPr lang="ru-RU" dirty="0" smtClean="0"/>
-              <a:t> ADO.NET </a:t>
-            </a:r>
-            <a:r>
-              <a:rPr lang="ru-RU" dirty="0" err="1" smtClean="0"/>
-              <a:t>від</a:t>
-            </a:r>
-            <a:r>
-              <a:rPr lang="ru-RU" dirty="0" smtClean="0"/>
-              <a:t> </a:t>
-            </a:r>
-            <a:r>
-              <a:rPr lang="ru-RU" dirty="0" err="1" smtClean="0"/>
-              <a:t>Microsoft</a:t>
+          <a:bodyPr/>
+          <a:lstStyle/>
+          <a:p>
+            <a:r>
+              <a:rPr lang="en-US" dirty="0" smtClean="0"/>
+              <a:t>ADO.NET Entity Framework stack</a:t>
             </a:r>
             <a:endParaRPr lang="uk-UA" dirty="0"/>
           </a:p>
         </p:txBody>
       </p:sp>
-      <p:graphicFrame>
-        <p:nvGraphicFramePr>
-          <p:cNvPr id="5" name="Содержимое 4"/>
-          <p:cNvGraphicFramePr>
-            <a:graphicFrameLocks noGrp="1"/>
-          </p:cNvGraphicFramePr>
+      <p:sp>
+        <p:nvSpPr>
+          <p:cNvPr id="3" name="Содержимое 2"/>
+          <p:cNvSpPr>
+            <a:spLocks noGrp="1"/>
+          </p:cNvSpPr>
           <p:nvPr>
             <p:ph sz="quarter" idx="1"/>
           </p:nvPr>
-        </p:nvGraphicFramePr>
-        <p:xfrm>
-          <a:off x="457200" y="1219200"/>
-          <a:ext cx="8229600" cy="2763520"/>
-        </p:xfrm>
-        <a:graphic>
-          <a:graphicData uri="http://schemas.openxmlformats.org/drawingml/2006/table">
-            <a:tbl>
-              <a:tblPr firstRow="1" bandRow="1">
-                <a:tableStyleId>{5DA37D80-6434-44D0-A028-1B22A696006F}</a:tableStyleId>
-              </a:tblPr>
-              <a:tblGrid>
-                <a:gridCol w="2743200"/>
-                <a:gridCol w="2743200"/>
-                <a:gridCol w="2743200"/>
-              </a:tblGrid>
-              <a:tr h="370840">
-                <a:tc>
-                  <a:txBody>
-                    <a:bodyPr/>
-                    <a:lstStyle/>
-                    <a:p>
-                      <a:pPr algn="ctr"/>
-                      <a:r>
-                        <a:rPr lang="uk-UA" dirty="0"/>
-                        <a:t>Постачальник даних</a:t>
-                      </a:r>
-                    </a:p>
-                  </a:txBody>
-                  <a:tcPr anchor="ctr"/>
-                </a:tc>
-                <a:tc>
-                  <a:txBody>
-                    <a:bodyPr/>
-                    <a:lstStyle/>
-                    <a:p>
-                      <a:pPr algn="ctr"/>
-                      <a:r>
-                        <a:rPr lang="uk-UA"/>
-                        <a:t>Простір імен</a:t>
-                      </a:r>
-                    </a:p>
-                  </a:txBody>
-                  <a:tcPr anchor="ctr"/>
-                </a:tc>
-                <a:tc>
-                  <a:txBody>
-                    <a:bodyPr/>
-                    <a:lstStyle/>
-                    <a:p>
-                      <a:pPr algn="ctr"/>
-                      <a:r>
-                        <a:rPr lang="uk-UA"/>
-                        <a:t>Компоновочний блок</a:t>
-                      </a:r>
-                    </a:p>
-                  </a:txBody>
-                  <a:tcPr anchor="ctr"/>
-                </a:tc>
-              </a:tr>
-              <a:tr h="370840">
-                <a:tc>
-                  <a:txBody>
-                    <a:bodyPr/>
-                    <a:lstStyle/>
-                    <a:p>
-                      <a:r>
-                        <a:rPr lang="en-US"/>
-                        <a:t>OLE DB</a:t>
-                      </a:r>
-                    </a:p>
-                  </a:txBody>
-                  <a:tcPr anchor="ctr"/>
-                </a:tc>
-                <a:tc>
-                  <a:txBody>
-                    <a:bodyPr/>
-                    <a:lstStyle/>
-                    <a:p>
-                      <a:r>
-                        <a:rPr lang="en-US"/>
-                        <a:t>System.Data.OleDb</a:t>
-                      </a:r>
-                    </a:p>
-                  </a:txBody>
-                  <a:tcPr anchor="ctr"/>
-                </a:tc>
-                <a:tc>
-                  <a:txBody>
-                    <a:bodyPr/>
-                    <a:lstStyle/>
-                    <a:p>
-                      <a:r>
-                        <a:rPr lang="en-US"/>
-                        <a:t>System.Data.dll</a:t>
-                      </a:r>
-                    </a:p>
-                  </a:txBody>
-                  <a:tcPr anchor="ctr"/>
-                </a:tc>
-              </a:tr>
-              <a:tr h="370840">
-                <a:tc>
-                  <a:txBody>
-                    <a:bodyPr/>
-                    <a:lstStyle/>
-                    <a:p>
-                      <a:r>
-                        <a:rPr lang="en-US" u="none" strike="noStrike" dirty="0"/>
-                        <a:t>Microsoft SQL Server</a:t>
-                      </a:r>
-                      <a:endParaRPr lang="en-US" dirty="0"/>
-                    </a:p>
-                  </a:txBody>
-                  <a:tcPr anchor="ctr"/>
-                </a:tc>
-                <a:tc>
-                  <a:txBody>
-                    <a:bodyPr/>
-                    <a:lstStyle/>
-                    <a:p>
-                      <a:r>
-                        <a:rPr lang="en-US"/>
-                        <a:t>System.Data.SqlClient</a:t>
-                      </a:r>
-                    </a:p>
-                  </a:txBody>
-                  <a:tcPr anchor="ctr"/>
-                </a:tc>
-                <a:tc>
-                  <a:txBody>
-                    <a:bodyPr/>
-                    <a:lstStyle/>
-                    <a:p>
-                      <a:r>
-                        <a:rPr lang="en-US"/>
-                        <a:t>System.Data.dll</a:t>
-                      </a:r>
-                    </a:p>
-                  </a:txBody>
-                  <a:tcPr anchor="ctr"/>
-                </a:tc>
-              </a:tr>
-              <a:tr h="370840">
-                <a:tc>
-                  <a:txBody>
-                    <a:bodyPr/>
-                    <a:lstStyle/>
-                    <a:p>
-                      <a:r>
-                        <a:rPr lang="en-US"/>
-                        <a:t>Microsoft SQL Server Mobile</a:t>
-                      </a:r>
-                    </a:p>
-                  </a:txBody>
-                  <a:tcPr anchor="ctr"/>
-                </a:tc>
-                <a:tc>
-                  <a:txBody>
-                    <a:bodyPr/>
-                    <a:lstStyle/>
-                    <a:p>
-                      <a:r>
-                        <a:rPr lang="en-US"/>
-                        <a:t>System.Data.SqlServerCe</a:t>
-                      </a:r>
-                    </a:p>
-                  </a:txBody>
-                  <a:tcPr anchor="ctr"/>
-                </a:tc>
-                <a:tc>
-                  <a:txBody>
-                    <a:bodyPr/>
-                    <a:lstStyle/>
-                    <a:p>
-                      <a:r>
-                        <a:rPr lang="en-US"/>
-                        <a:t>System.Data.SqlServerCe.dll</a:t>
-                      </a:r>
-                    </a:p>
-                  </a:txBody>
-                  <a:tcPr anchor="ctr"/>
-                </a:tc>
-              </a:tr>
-              <a:tr h="370840">
-                <a:tc>
-                  <a:txBody>
-                    <a:bodyPr/>
-                    <a:lstStyle/>
-                    <a:p>
-                      <a:r>
-                        <a:rPr lang="en-US"/>
-                        <a:t>ODBC</a:t>
-                      </a:r>
-                    </a:p>
-                  </a:txBody>
-                  <a:tcPr anchor="ctr"/>
-                </a:tc>
-                <a:tc>
-                  <a:txBody>
-                    <a:bodyPr/>
-                    <a:lstStyle/>
-                    <a:p>
-                      <a:r>
-                        <a:rPr lang="en-US"/>
-                        <a:t>System.Data.Odbc</a:t>
-                      </a:r>
-                    </a:p>
-                  </a:txBody>
-                  <a:tcPr anchor="ctr"/>
-                </a:tc>
-                <a:tc>
-                  <a:txBody>
-                    <a:bodyPr/>
-                    <a:lstStyle/>
-                    <a:p>
-                      <a:r>
-                        <a:rPr lang="en-US"/>
-                        <a:t>System.Data.dll</a:t>
-                      </a:r>
-                    </a:p>
-                  </a:txBody>
-                  <a:tcPr anchor="ctr"/>
-                </a:tc>
-              </a:tr>
-              <a:tr h="370840">
-                <a:tc>
-                  <a:txBody>
-                    <a:bodyPr/>
-                    <a:lstStyle/>
-                    <a:p>
-                      <a:r>
-                        <a:rPr lang="en-US"/>
-                        <a:t>Oracle</a:t>
-                      </a:r>
-                    </a:p>
-                  </a:txBody>
-                  <a:tcPr anchor="ctr"/>
-                </a:tc>
-                <a:tc>
-                  <a:txBody>
-                    <a:bodyPr/>
-                    <a:lstStyle/>
-                    <a:p>
-                      <a:r>
-                        <a:rPr lang="en-US"/>
-                        <a:t>System.Data.OracleClient</a:t>
-                      </a:r>
-                    </a:p>
-                  </a:txBody>
-                  <a:tcPr anchor="ctr"/>
-                </a:tc>
-                <a:tc>
-                  <a:txBody>
-                    <a:bodyPr/>
-                    <a:lstStyle/>
-                    <a:p>
-                      <a:r>
-                        <a:rPr lang="en-US" dirty="0" err="1"/>
-                        <a:t>System.Data.OracleClient.dll</a:t>
-                      </a:r>
-                      <a:endParaRPr lang="en-US" dirty="0"/>
-                    </a:p>
-                  </a:txBody>
-                  <a:tcPr anchor="ctr"/>
-                </a:tc>
-              </a:tr>
-            </a:tbl>
-          </a:graphicData>
-        </a:graphic>
-      </p:graphicFrame>
+        </p:nvSpPr>
+        <p:spPr/>
+        <p:txBody>
+          <a:bodyPr/>
+          <a:lstStyle/>
+          <a:p>
+            <a:endParaRPr lang="uk-UA" dirty="0"/>
+          </a:p>
+        </p:txBody>
+      </p:sp>
+      <p:pic>
+        <p:nvPicPr>
+          <p:cNvPr id="33794" name="Picture 2" descr="ADO.NET_Entity_Framework_stack.png (395×580)"/>
+          <p:cNvPicPr>
+            <a:picLocks noChangeAspect="1" noChangeArrowheads="1"/>
+          </p:cNvPicPr>
+          <p:nvPr/>
+        </p:nvPicPr>
+        <p:blipFill>
+          <a:blip r:embed="rId2" cstate="print"/>
+          <a:srcRect/>
+          <a:stretch>
+            <a:fillRect/>
+          </a:stretch>
+        </p:blipFill>
+        <p:spPr bwMode="auto">
+          <a:xfrm>
+            <a:off x="2699792" y="1195840"/>
+            <a:ext cx="3482456" cy="5113480"/>
+          </a:xfrm>
+          <a:prstGeom prst="rect">
+            <a:avLst/>
+          </a:prstGeom>
+          <a:noFill/>
+        </p:spPr>
+      </p:pic>
     </p:spTree>
   </p:cSld>
   <p:clrMapOvr>
@@ -6511,7 +6058,7 @@
           <a:p>
             <a:r>
               <a:rPr lang="en-US" dirty="0" smtClean="0"/>
-              <a:t>ADO.NET Entity Framework stack</a:t>
+              <a:t>Hibernate</a:t>
             </a:r>
             <a:endParaRPr lang="uk-UA" dirty="0"/>
           </a:p>
@@ -6532,36 +6079,14 @@
           <a:bodyPr/>
           <a:lstStyle/>
           <a:p>
+            <a:r>
+              <a:rPr lang="en-US" dirty="0" smtClean="0"/>
+              <a:t>???</a:t>
+            </a:r>
             <a:endParaRPr lang="uk-UA" dirty="0"/>
           </a:p>
         </p:txBody>
       </p:sp>
-      <p:pic>
-        <p:nvPicPr>
-          <p:cNvPr id="33794" name="Picture 2" descr="ADO.NET_Entity_Framework_stack.png (395×580)"/>
-          <p:cNvPicPr>
-            <a:picLocks noChangeAspect="1" noChangeArrowheads="1"/>
-          </p:cNvPicPr>
-          <p:nvPr/>
-        </p:nvPicPr>
-        <p:blipFill>
-          <a:blip r:embed="rId2" cstate="print"/>
-          <a:srcRect/>
-          <a:stretch>
-            <a:fillRect/>
-          </a:stretch>
-        </p:blipFill>
-        <p:spPr bwMode="auto">
-          <a:xfrm>
-            <a:off x="2699792" y="1195840"/>
-            <a:ext cx="3482456" cy="5113480"/>
-          </a:xfrm>
-          <a:prstGeom prst="rect">
-            <a:avLst/>
-          </a:prstGeom>
-          <a:noFill/>
-        </p:spPr>
-      </p:pic>
     </p:spTree>
   </p:cSld>
   <p:clrMapOvr>

</xml_diff>

<commit_message>
Added model-first solution; added diagrams in precendents; fixed presentation
</commit_message>
<xml_diff>
--- a/Documents/DB.pptx
+++ b/Documents/DB.pptx
@@ -259,7 +259,7 @@
             <a:fld id="{5B106E36-FD25-4E2D-B0AA-010F637433A0}" type="datetimeFigureOut">
               <a:rPr lang="ru-RU" smtClean="0"/>
               <a:pPr/>
-              <a:t>11.05.2017</a:t>
+              <a:t>14.05.2017</a:t>
             </a:fld>
             <a:endParaRPr lang="ru-RU"/>
           </a:p>
@@ -620,7 +620,7 @@
             <a:fld id="{5B106E36-FD25-4E2D-B0AA-010F637433A0}" type="datetimeFigureOut">
               <a:rPr lang="ru-RU" smtClean="0"/>
               <a:pPr/>
-              <a:t>11.05.2017</a:t>
+              <a:t>14.05.2017</a:t>
             </a:fld>
             <a:endParaRPr lang="ru-RU"/>
           </a:p>
@@ -797,7 +797,7 @@
             <a:fld id="{5B106E36-FD25-4E2D-B0AA-010F637433A0}" type="datetimeFigureOut">
               <a:rPr lang="ru-RU" smtClean="0"/>
               <a:pPr/>
-              <a:t>11.05.2017</a:t>
+              <a:t>14.05.2017</a:t>
             </a:fld>
             <a:endParaRPr lang="ru-RU"/>
           </a:p>
@@ -1034,7 +1034,7 @@
             <a:fld id="{5B106E36-FD25-4E2D-B0AA-010F637433A0}" type="datetimeFigureOut">
               <a:rPr lang="ru-RU" smtClean="0"/>
               <a:pPr/>
-              <a:t>11.05.2017</a:t>
+              <a:t>14.05.2017</a:t>
             </a:fld>
             <a:endParaRPr lang="ru-RU"/>
           </a:p>
@@ -1305,7 +1305,7 @@
             <a:fld id="{5B106E36-FD25-4E2D-B0AA-010F637433A0}" type="datetimeFigureOut">
               <a:rPr lang="ru-RU" smtClean="0"/>
               <a:pPr/>
-              <a:t>11.05.2017</a:t>
+              <a:t>14.05.2017</a:t>
             </a:fld>
             <a:endParaRPr lang="ru-RU"/>
           </a:p>
@@ -1527,7 +1527,7 @@
             <a:fld id="{5B106E36-FD25-4E2D-B0AA-010F637433A0}" type="datetimeFigureOut">
               <a:rPr lang="ru-RU" smtClean="0"/>
               <a:pPr/>
-              <a:t>11.05.2017</a:t>
+              <a:t>14.05.2017</a:t>
             </a:fld>
             <a:endParaRPr lang="ru-RU"/>
           </a:p>
@@ -1881,7 +1881,7 @@
             <a:fld id="{5B106E36-FD25-4E2D-B0AA-010F637433A0}" type="datetimeFigureOut">
               <a:rPr lang="ru-RU" smtClean="0"/>
               <a:pPr/>
-              <a:t>11.05.2017</a:t>
+              <a:t>14.05.2017</a:t>
             </a:fld>
             <a:endParaRPr lang="ru-RU"/>
           </a:p>
@@ -2115,7 +2115,7 @@
             <a:fld id="{5B106E36-FD25-4E2D-B0AA-010F637433A0}" type="datetimeFigureOut">
               <a:rPr lang="ru-RU" smtClean="0"/>
               <a:pPr/>
-              <a:t>11.05.2017</a:t>
+              <a:t>14.05.2017</a:t>
             </a:fld>
             <a:endParaRPr lang="ru-RU"/>
           </a:p>
@@ -2257,7 +2257,7 @@
             <a:fld id="{5B106E36-FD25-4E2D-B0AA-010F637433A0}" type="datetimeFigureOut">
               <a:rPr lang="ru-RU" smtClean="0"/>
               <a:pPr/>
-              <a:t>11.05.2017</a:t>
+              <a:t>14.05.2017</a:t>
             </a:fld>
             <a:endParaRPr lang="ru-RU"/>
           </a:p>
@@ -2536,7 +2536,7 @@
             <a:fld id="{5B106E36-FD25-4E2D-B0AA-010F637433A0}" type="datetimeFigureOut">
               <a:rPr lang="ru-RU" smtClean="0"/>
               <a:pPr/>
-              <a:t>11.05.2017</a:t>
+              <a:t>14.05.2017</a:t>
             </a:fld>
             <a:endParaRPr lang="ru-RU"/>
           </a:p>
@@ -2945,7 +2945,7 @@
             <a:fld id="{5B106E36-FD25-4E2D-B0AA-010F637433A0}" type="datetimeFigureOut">
               <a:rPr lang="ru-RU" smtClean="0"/>
               <a:pPr/>
-              <a:t>11.05.2017</a:t>
+              <a:t>14.05.2017</a:t>
             </a:fld>
             <a:endParaRPr lang="ru-RU"/>
           </a:p>
@@ -3285,7 +3285,7 @@
             <a:fld id="{5B106E36-FD25-4E2D-B0AA-010F637433A0}" type="datetimeFigureOut">
               <a:rPr lang="ru-RU" smtClean="0"/>
               <a:pPr/>
-              <a:t>11.05.2017</a:t>
+              <a:t>14.05.2017</a:t>
             </a:fld>
             <a:endParaRPr lang="ru-RU"/>
           </a:p>
@@ -4058,127 +4058,33 @@
         <p:spPr/>
         <p:txBody>
           <a:bodyPr>
-            <a:normAutofit fontScale="77500" lnSpcReduction="20000"/>
+            <a:normAutofit/>
           </a:bodyPr>
           <a:lstStyle/>
           <a:p>
             <a:r>
               <a:rPr lang="uk-UA" dirty="0" smtClean="0"/>
-              <a:t>Програміст пише класи повністю вручну, і поля з примітивними типами даних, и </a:t>
-            </a:r>
-            <a:r>
-              <a:rPr lang="uk-UA" dirty="0" err="1" smtClean="0">
-                <a:solidFill>
-                  <a:srgbClr val="FF0000"/>
-                </a:solidFill>
-              </a:rPr>
-              <a:t>ссылочные</a:t>
+              <a:t>Програміст пише класи повністю вручну</a:t>
             </a:r>
             <a:r>
               <a:rPr lang="uk-UA" dirty="0" smtClean="0"/>
-              <a:t>. Потім </a:t>
-            </a:r>
-            <a:r>
-              <a:rPr lang="uk-UA" dirty="0" err="1" smtClean="0"/>
-              <a:t>налаштовує—</a:t>
+              <a:t>, </a:t>
             </a:r>
             <a:r>
               <a:rPr lang="uk-UA" dirty="0" smtClean="0"/>
-              <a:t> вказує, що клас </a:t>
-            </a:r>
-            <a:r>
-              <a:rPr lang="uk-UA" dirty="0" err="1" smtClean="0"/>
-              <a:t>Client</a:t>
+              <a:t>поля з примітивними типами даних, </a:t>
             </a:r>
             <a:r>
               <a:rPr lang="uk-UA" dirty="0" smtClean="0"/>
-              <a:t> </a:t>
-            </a:r>
-            <a:r>
-              <a:rPr lang="uk-UA" dirty="0" err="1" smtClean="0"/>
-              <a:t>співставлений</a:t>
+              <a:t>і</a:t>
             </a:r>
             <a:r>
               <a:rPr lang="uk-UA" dirty="0" smtClean="0"/>
-              <a:t> з таблицею TBL_CLIENTS, а поле </a:t>
-            </a:r>
-            <a:r>
-              <a:rPr lang="uk-UA" dirty="0" err="1" smtClean="0"/>
-              <a:t>Client</a:t>
+              <a:t> ключі; потім налаштовує. По </a:t>
             </a:r>
             <a:r>
               <a:rPr lang="uk-UA" dirty="0" smtClean="0"/>
-              <a:t> в класі </a:t>
-            </a:r>
-            <a:r>
-              <a:rPr lang="uk-UA" dirty="0" err="1" smtClean="0"/>
-              <a:t>Order</a:t>
-            </a:r>
-            <a:r>
-              <a:rPr lang="uk-UA" dirty="0" smtClean="0"/>
-              <a:t> відповідає запису в таблиці TBL_CLIENTS, яка загружається по значенню із стовпця CLIENT_ID таблиці TBL_ORDERS.</a:t>
-            </a:r>
-            <a:br>
-              <a:rPr lang="uk-UA" dirty="0" smtClean="0"/>
-            </a:br>
-            <a:r>
-              <a:rPr lang="uk-UA" dirty="0" smtClean="0"/>
-              <a:t>Можуть бути і зворотні </a:t>
-            </a:r>
-            <a:r>
-              <a:rPr lang="uk-UA" dirty="0" err="1" smtClean="0"/>
-              <a:t>зв</a:t>
-            </a:r>
-            <a:r>
-              <a:rPr lang="en-US" dirty="0" smtClean="0"/>
-              <a:t>’</a:t>
-            </a:r>
-            <a:r>
-              <a:rPr lang="uk-UA" dirty="0" err="1" smtClean="0"/>
-              <a:t>язки</a:t>
-            </a:r>
-            <a:r>
-              <a:rPr lang="uk-UA" dirty="0" smtClean="0"/>
-              <a:t>: наприклад, колекція </a:t>
-            </a:r>
-            <a:r>
-              <a:rPr lang="uk-UA" dirty="0" err="1" smtClean="0"/>
-              <a:t>Orders</a:t>
-            </a:r>
-            <a:r>
-              <a:rPr lang="uk-UA" dirty="0" smtClean="0"/>
-              <a:t> в класі </a:t>
-            </a:r>
-            <a:r>
-              <a:rPr lang="uk-UA" dirty="0" err="1" smtClean="0"/>
-              <a:t>Client</a:t>
-            </a:r>
-            <a:r>
-              <a:rPr lang="uk-UA" dirty="0" smtClean="0"/>
-              <a:t> </a:t>
-            </a:r>
-            <a:r>
-              <a:rPr lang="uk-UA" dirty="0" err="1" smtClean="0"/>
-              <a:t>збираєтся</a:t>
-            </a:r>
-            <a:r>
-              <a:rPr lang="uk-UA" dirty="0" smtClean="0"/>
-              <a:t> по посиланням на цей запис в TBL_CLIENTS із поля CLIENT_ID таблиці TBL_ORDERS. Тобто, в таблиці TBL_CLIENTS немає ніяких згадок про замовлення, але в класі </a:t>
-            </a:r>
-            <a:r>
-              <a:rPr lang="uk-UA" dirty="0" err="1" smtClean="0"/>
-              <a:t>Client</a:t>
-            </a:r>
-            <a:r>
-              <a:rPr lang="uk-UA" dirty="0" smtClean="0"/>
-              <a:t> є колекція замовлень даного клієнта.</a:t>
-            </a:r>
-            <a:br>
-              <a:rPr lang="uk-UA" dirty="0" smtClean="0"/>
-            </a:br>
-            <a:r>
-              <a:rPr lang="uk-UA" dirty="0" smtClean="0"/>
-              <a:t>По написаному коду можна згенерувати базу даних.</a:t>
+              <a:t>написаному коду можна згенерувати базу даних.</a:t>
             </a:r>
           </a:p>
           <a:p>

</xml_diff>